<commit_message>
Fix slide show options
</commit_message>
<xml_diff>
--- a/20170121/RichardCook_SeaHUGAgenda_20170121.pptx
+++ b/20170121/RichardCook_SeaHUGAgenda_20170121.pptx
@@ -3328,11 +3328,7 @@
           <a:p>
             <a:r>
               <a:rPr lang="en-US" smtClean="0"/>
-              <a:t>Talks </a:t>
-            </a:r>
-            <a:r>
-              <a:rPr lang="en-US" smtClean="0"/>
-              <a:t>(in </a:t>
+              <a:t>Talks (in </a:t>
             </a:r>
             <a:r>
               <a:rPr lang="en-US" dirty="0" smtClean="0"/>
@@ -3340,11 +3336,7 @@
             </a:r>
             <a:r>
               <a:rPr lang="en-US" smtClean="0"/>
-              <a:t>particular </a:t>
-            </a:r>
-            <a:r>
-              <a:rPr lang="en-US" smtClean="0"/>
-              <a:t>order)</a:t>
+              <a:t>particular order)</a:t>
             </a:r>
             <a:endParaRPr lang="en-US" dirty="0"/>
           </a:p>

</xml_diff>

<commit_message>
Fix wording in PPTX
</commit_message>
<xml_diff>
--- a/20170121/RichardCook_SeaHUGAgenda_20170121.pptx
+++ b/20170121/RichardCook_SeaHUGAgenda_20170121.pptx
@@ -243,7 +243,7 @@
           <a:p>
             <a:fld id="{F1FA7AC5-6045-4418-8E60-F48788734473}" type="datetimeFigureOut">
               <a:rPr lang="en-US" smtClean="0"/>
-              <a:t>1/21/17</a:t>
+              <a:t>2/5/2017</a:t>
             </a:fld>
             <a:endParaRPr lang="en-US"/>
           </a:p>
@@ -300,7 +300,7 @@
           <p:nvPr userDrawn="1"/>
         </p:nvPicPr>
         <p:blipFill>
-          <a:blip r:embed="rId2">
+          <a:blip r:embed="rId2" cstate="print">
             <a:alphaModFix amt="50000"/>
             <a:extLst>
               <a:ext uri="{28A0092B-C50C-407E-A947-70E740481C1C}">
@@ -332,13 +332,6 @@
   <p:clrMapOvr>
     <a:masterClrMapping/>
   </p:clrMapOvr>
-  <p:timing>
-    <p:tnLst>
-      <p:par>
-        <p:cTn id="1" dur="indefinite" restart="never" nodeType="tmRoot"/>
-      </p:par>
-    </p:tnLst>
-  </p:timing>
 </p:sldLayout>
 </file>
 
@@ -449,7 +442,7 @@
           <a:p>
             <a:fld id="{F1FA7AC5-6045-4418-8E60-F48788734473}" type="datetimeFigureOut">
               <a:rPr lang="en-US" smtClean="0"/>
-              <a:t>1/21/17</a:t>
+              <a:t>2/5/2017</a:t>
             </a:fld>
             <a:endParaRPr lang="en-US"/>
           </a:p>
@@ -627,7 +620,7 @@
           <a:p>
             <a:fld id="{F1FA7AC5-6045-4418-8E60-F48788734473}" type="datetimeFigureOut">
               <a:rPr lang="en-US" smtClean="0"/>
-              <a:t>1/21/17</a:t>
+              <a:t>2/5/2017</a:t>
             </a:fld>
             <a:endParaRPr lang="en-US"/>
           </a:p>
@@ -795,7 +788,7 @@
           <a:p>
             <a:fld id="{F1FA7AC5-6045-4418-8E60-F48788734473}" type="datetimeFigureOut">
               <a:rPr lang="en-US" smtClean="0"/>
-              <a:t>1/21/17</a:t>
+              <a:t>2/5/2017</a:t>
             </a:fld>
             <a:endParaRPr lang="en-US"/>
           </a:p>
@@ -852,7 +845,7 @@
           <p:nvPr userDrawn="1"/>
         </p:nvPicPr>
         <p:blipFill>
-          <a:blip r:embed="rId2">
+          <a:blip r:embed="rId2" cstate="print">
             <a:alphaModFix amt="50000"/>
             <a:extLst>
               <a:ext uri="{28A0092B-C50C-407E-A947-70E740481C1C}">
@@ -884,13 +877,6 @@
   <p:clrMapOvr>
     <a:masterClrMapping/>
   </p:clrMapOvr>
-  <p:timing>
-    <p:tnLst>
-      <p:par>
-        <p:cTn id="1" dur="indefinite" restart="never" nodeType="tmRoot"/>
-      </p:par>
-    </p:tnLst>
-  </p:timing>
 </p:sldLayout>
 </file>
 
@@ -1078,7 +1064,7 @@
           <a:p>
             <a:fld id="{F1FA7AC5-6045-4418-8E60-F48788734473}" type="datetimeFigureOut">
               <a:rPr lang="en-US" smtClean="0"/>
-              <a:t>1/21/17</a:t>
+              <a:t>2/5/2017</a:t>
             </a:fld>
             <a:endParaRPr lang="en-US"/>
           </a:p>
@@ -1307,7 +1293,7 @@
           <a:p>
             <a:fld id="{F1FA7AC5-6045-4418-8E60-F48788734473}" type="datetimeFigureOut">
               <a:rPr lang="en-US" smtClean="0"/>
-              <a:t>1/21/17</a:t>
+              <a:t>2/5/2017</a:t>
             </a:fld>
             <a:endParaRPr lang="en-US"/>
           </a:p>
@@ -1671,7 +1657,7 @@
           <a:p>
             <a:fld id="{F1FA7AC5-6045-4418-8E60-F48788734473}" type="datetimeFigureOut">
               <a:rPr lang="en-US" smtClean="0"/>
-              <a:t>1/21/17</a:t>
+              <a:t>2/5/2017</a:t>
             </a:fld>
             <a:endParaRPr lang="en-US"/>
           </a:p>
@@ -1788,7 +1774,7 @@
           <a:p>
             <a:fld id="{F1FA7AC5-6045-4418-8E60-F48788734473}" type="datetimeFigureOut">
               <a:rPr lang="en-US" smtClean="0"/>
-              <a:t>1/21/17</a:t>
+              <a:t>2/5/2017</a:t>
             </a:fld>
             <a:endParaRPr lang="en-US"/>
           </a:p>
@@ -1883,7 +1869,7 @@
           <a:p>
             <a:fld id="{F1FA7AC5-6045-4418-8E60-F48788734473}" type="datetimeFigureOut">
               <a:rPr lang="en-US" smtClean="0"/>
-              <a:t>1/21/17</a:t>
+              <a:t>2/5/2017</a:t>
             </a:fld>
             <a:endParaRPr lang="en-US"/>
           </a:p>
@@ -2158,7 +2144,7 @@
           <a:p>
             <a:fld id="{F1FA7AC5-6045-4418-8E60-F48788734473}" type="datetimeFigureOut">
               <a:rPr lang="en-US" smtClean="0"/>
-              <a:t>1/21/17</a:t>
+              <a:t>2/5/2017</a:t>
             </a:fld>
             <a:endParaRPr lang="en-US"/>
           </a:p>
@@ -2410,7 +2396,7 @@
           <a:p>
             <a:fld id="{F1FA7AC5-6045-4418-8E60-F48788734473}" type="datetimeFigureOut">
               <a:rPr lang="en-US" smtClean="0"/>
-              <a:t>1/21/17</a:t>
+              <a:t>2/5/2017</a:t>
             </a:fld>
             <a:endParaRPr lang="en-US"/>
           </a:p>
@@ -2621,7 +2607,7 @@
           <a:p>
             <a:fld id="{F1FA7AC5-6045-4418-8E60-F48788734473}" type="datetimeFigureOut">
               <a:rPr lang="en-US" smtClean="0"/>
-              <a:t>1/21/17</a:t>
+              <a:t>2/5/2017</a:t>
             </a:fld>
             <a:endParaRPr lang="en-US"/>
           </a:p>
@@ -3047,10 +3033,9 @@
           <a:lstStyle/>
           <a:p>
             <a:r>
-              <a:rPr lang="en-US" dirty="0" smtClean="0"/>
+              <a:rPr lang="en-US" dirty="0"/>
               <a:t>Seattle Area Haskell Users’ Group</a:t>
             </a:r>
-            <a:endParaRPr lang="en-US" dirty="0"/>
           </a:p>
         </p:txBody>
       </p:sp>
@@ -3070,14 +3055,9 @@
           <a:lstStyle/>
           <a:p>
             <a:r>
-              <a:rPr lang="en-US" smtClean="0"/>
-              <a:t>Agenda 21 </a:t>
-            </a:r>
-            <a:r>
-              <a:rPr lang="en-US" dirty="0" smtClean="0"/>
-              <a:t>January 2017 meeting</a:t>
-            </a:r>
-            <a:endParaRPr lang="en-US" dirty="0"/>
+              <a:rPr lang="en-US" dirty="0"/>
+              <a:t>21 January 2017 meeting agenda</a:t>
+            </a:r>
           </a:p>
         </p:txBody>
       </p:sp>
@@ -3091,13 +3071,6 @@
   <p:clrMapOvr>
     <a:masterClrMapping/>
   </p:clrMapOvr>
-  <p:timing>
-    <p:tnLst>
-      <p:par>
-        <p:cTn id="1" dur="indefinite" restart="never" nodeType="tmRoot"/>
-      </p:par>
-    </p:tnLst>
-  </p:timing>
 </p:sld>
 </file>
 
@@ -3134,10 +3107,9 @@
           <a:lstStyle/>
           <a:p>
             <a:r>
-              <a:rPr lang="en-US" dirty="0" smtClean="0"/>
+              <a:rPr lang="en-US" dirty="0"/>
               <a:t>Announcements</a:t>
             </a:r>
-            <a:endParaRPr lang="en-US" dirty="0"/>
           </a:p>
         </p:txBody>
       </p:sp>
@@ -3164,113 +3136,89 @@
           <a:lstStyle/>
           <a:p>
             <a:r>
-              <a:rPr lang="en-US" dirty="0" smtClean="0"/>
-              <a:t>Category </a:t>
-            </a:r>
-            <a:r>
               <a:rPr lang="en-US" dirty="0"/>
-              <a:t>Theory for Programmers Part </a:t>
-            </a:r>
-            <a:r>
-              <a:rPr lang="en-US" dirty="0" smtClean="0"/>
-              <a:t>2</a:t>
+              <a:t>Category Theory for Programmers Part 2</a:t>
             </a:r>
           </a:p>
           <a:p>
             <a:pPr lvl="1"/>
             <a:r>
-              <a:rPr lang="en-US" dirty="0" err="1" smtClean="0"/>
+              <a:rPr lang="en-US" dirty="0" err="1"/>
               <a:t>Bartosz</a:t>
             </a:r>
             <a:r>
-              <a:rPr lang="en-US" dirty="0" smtClean="0"/>
+              <a:rPr lang="en-US" dirty="0"/>
               <a:t> </a:t>
             </a:r>
             <a:r>
-              <a:rPr lang="en-US" dirty="0" err="1" smtClean="0"/>
+              <a:rPr lang="en-US" dirty="0" err="1"/>
               <a:t>Milewski</a:t>
             </a:r>
             <a:r>
-              <a:rPr lang="en-US" dirty="0" smtClean="0"/>
+              <a:rPr lang="en-US" dirty="0"/>
               <a:t> returns</a:t>
             </a:r>
           </a:p>
           <a:p>
             <a:pPr lvl="1"/>
             <a:r>
-              <a:rPr lang="en-US" dirty="0" smtClean="0"/>
-              <a:t>Starts </a:t>
-            </a:r>
-            <a:r>
               <a:rPr lang="en-US" dirty="0"/>
-              <a:t>on </a:t>
-            </a:r>
-            <a:r>
-              <a:rPr lang="en-US" dirty="0" smtClean="0"/>
-              <a:t>15 </a:t>
-            </a:r>
-            <a:r>
-              <a:rPr lang="en-US" dirty="0" err="1" smtClean="0"/>
+              <a:t>Starts on 15 </a:t>
+            </a:r>
+            <a:r>
+              <a:rPr lang="en-US" dirty="0" err="1"/>
               <a:t>Feburary</a:t>
             </a:r>
             <a:r>
-              <a:rPr lang="en-US" dirty="0" smtClean="0"/>
+              <a:rPr lang="en-US" dirty="0"/>
               <a:t> 2017</a:t>
             </a:r>
           </a:p>
           <a:p>
             <a:pPr lvl="1"/>
             <a:r>
-              <a:rPr lang="en-US" dirty="0" smtClean="0">
+              <a:rPr lang="en-US" dirty="0">
                 <a:hlinkClick r:id="rId2"/>
               </a:rPr>
               <a:t>Register at Eventbrite</a:t>
             </a:r>
-            <a:endParaRPr lang="en-US" dirty="0" smtClean="0"/>
-          </a:p>
-          <a:p>
-            <a:r>
-              <a:rPr lang="en-US" dirty="0" smtClean="0"/>
-              <a:t>Results </a:t>
-            </a:r>
+            <a:endParaRPr lang="en-US" dirty="0"/>
+          </a:p>
+          <a:p>
             <a:r>
               <a:rPr lang="en-US" dirty="0"/>
-              <a:t>of </a:t>
-            </a:r>
-            <a:r>
-              <a:rPr lang="en-US" dirty="0" smtClean="0"/>
-              <a:t>polls</a:t>
+              <a:t>Results of polls</a:t>
             </a:r>
           </a:p>
           <a:p>
             <a:pPr lvl="1"/>
             <a:r>
-              <a:rPr lang="en-US" dirty="0" smtClean="0">
+              <a:rPr lang="en-US" dirty="0">
                 <a:hlinkClick r:id="rId3"/>
               </a:rPr>
               <a:t>Talk proposals</a:t>
             </a:r>
-            <a:endParaRPr lang="en-US" dirty="0" smtClean="0"/>
+            <a:endParaRPr lang="en-US" dirty="0"/>
           </a:p>
           <a:p>
             <a:pPr lvl="1"/>
             <a:r>
-              <a:rPr lang="en-US" dirty="0" smtClean="0">
+              <a:rPr lang="en-US" dirty="0">
                 <a:hlinkClick r:id="rId4"/>
               </a:rPr>
               <a:t>Requests for subjects</a:t>
             </a:r>
-            <a:endParaRPr lang="en-US" dirty="0" smtClean="0"/>
+            <a:endParaRPr lang="en-US" dirty="0"/>
           </a:p>
           <a:p>
             <a:pPr lvl="1"/>
             <a:r>
-              <a:rPr lang="en-US" dirty="0" smtClean="0">
+              <a:rPr lang="en-US" dirty="0">
                 <a:hlinkClick r:id="rId5"/>
               </a:rPr>
               <a:t>Visualization</a:t>
             </a:r>
-            <a:endParaRPr lang="en-US" dirty="0" smtClean="0"/>
+            <a:endParaRPr lang="en-US" dirty="0"/>
           </a:p>
         </p:txBody>
       </p:sp>
@@ -3284,13 +3232,6 @@
   <p:clrMapOvr>
     <a:masterClrMapping/>
   </p:clrMapOvr>
-  <p:timing>
-    <p:tnLst>
-      <p:par>
-        <p:cTn id="1" dur="indefinite" restart="never" nodeType="tmRoot"/>
-      </p:par>
-    </p:tnLst>
-  </p:timing>
 </p:sld>
 </file>
 
@@ -3327,15 +3268,15 @@
           <a:lstStyle/>
           <a:p>
             <a:r>
-              <a:rPr lang="en-US" smtClean="0"/>
+              <a:rPr lang="en-US"/>
               <a:t>Talks (in </a:t>
             </a:r>
             <a:r>
-              <a:rPr lang="en-US" dirty="0" smtClean="0"/>
+              <a:rPr lang="en-US" dirty="0"/>
               <a:t>no </a:t>
             </a:r>
             <a:r>
-              <a:rPr lang="en-US" smtClean="0"/>
+              <a:rPr lang="en-US"/>
               <a:t>particular order)</a:t>
             </a:r>
             <a:endParaRPr lang="en-US" dirty="0"/>
@@ -3365,123 +3306,83 @@
           <a:lstStyle/>
           <a:p>
             <a:r>
-              <a:rPr lang="en-US" i="1" dirty="0" err="1" smtClean="0">
+              <a:rPr lang="en-US" i="1" dirty="0" err="1">
                 <a:hlinkClick r:id="rId2"/>
               </a:rPr>
               <a:t>ScopedTypeVariables</a:t>
             </a:r>
             <a:r>
-              <a:rPr lang="en-US" i="1" dirty="0" smtClean="0">
-                <a:hlinkClick r:id="rId2"/>
-              </a:rPr>
-              <a:t> </a:t>
-            </a:r>
-            <a:r>
               <a:rPr lang="en-US" i="1" dirty="0">
                 <a:hlinkClick r:id="rId2"/>
               </a:rPr>
-              <a:t>language </a:t>
-            </a:r>
-            <a:r>
-              <a:rPr lang="en-US" i="1" dirty="0" smtClean="0">
-                <a:hlinkClick r:id="rId2"/>
-              </a:rPr>
-              <a:t>extension</a:t>
-            </a:r>
-            <a:endParaRPr lang="en-US" i="1" dirty="0" smtClean="0"/>
+              <a:t> language extension</a:t>
+            </a:r>
+            <a:endParaRPr lang="en-US" i="1" dirty="0"/>
           </a:p>
           <a:p>
             <a:pPr lvl="1"/>
             <a:r>
-              <a:rPr lang="en-US" dirty="0" smtClean="0"/>
+              <a:rPr lang="en-US" dirty="0"/>
               <a:t>Richard Cook</a:t>
             </a:r>
           </a:p>
           <a:p>
             <a:pPr lvl="1"/>
             <a:r>
-              <a:rPr lang="en-US" dirty="0" smtClean="0"/>
+              <a:rPr lang="en-US" dirty="0"/>
               <a:t>15 minutes</a:t>
             </a:r>
           </a:p>
           <a:p>
-            <a:r>
-              <a:rPr lang="en-US" i="1" dirty="0" smtClean="0">
-                <a:hlinkClick r:id="rId3"/>
-              </a:rPr>
-              <a:t>Literate </a:t>
-            </a:r>
             <a:r>
               <a:rPr lang="en-US" i="1" dirty="0">
                 <a:hlinkClick r:id="rId3"/>
               </a:rPr>
-              <a:t>Haskell </a:t>
-            </a:r>
-            <a:r>
-              <a:rPr lang="en-US" i="1" dirty="0" smtClean="0">
-                <a:hlinkClick r:id="rId3"/>
-              </a:rPr>
-              <a:t>template</a:t>
-            </a:r>
-            <a:endParaRPr lang="en-US" i="1" dirty="0" smtClean="0"/>
+              <a:t>Literate Haskell template</a:t>
+            </a:r>
+            <a:endParaRPr lang="en-US" i="1" dirty="0"/>
           </a:p>
           <a:p>
             <a:pPr lvl="1"/>
             <a:r>
-              <a:rPr lang="en-US" dirty="0" smtClean="0"/>
+              <a:rPr lang="en-US" dirty="0"/>
               <a:t>Richard Cook</a:t>
             </a:r>
           </a:p>
           <a:p>
             <a:pPr lvl="1"/>
             <a:r>
-              <a:rPr lang="en-US" dirty="0" smtClean="0"/>
+              <a:rPr lang="en-US" dirty="0"/>
               <a:t>5 minutes</a:t>
             </a:r>
           </a:p>
           <a:p>
-            <a:r>
-              <a:rPr lang="en-US" i="1" dirty="0" smtClean="0">
-                <a:hlinkClick r:id="rId4"/>
-              </a:rPr>
-              <a:t>Turtles </a:t>
-            </a:r>
             <a:r>
               <a:rPr lang="en-US" i="1" dirty="0">
                 <a:hlinkClick r:id="rId4"/>
               </a:rPr>
-              <a:t>All the Way </a:t>
-            </a:r>
-            <a:r>
-              <a:rPr lang="en-US" i="1" dirty="0" smtClean="0">
-                <a:hlinkClick r:id="rId4"/>
-              </a:rPr>
-              <a:t>Up</a:t>
+              <a:t>Turtles All the Way Up</a:t>
             </a:r>
             <a:endParaRPr lang="en-US" dirty="0"/>
           </a:p>
           <a:p>
             <a:pPr lvl="1"/>
             <a:r>
-              <a:rPr lang="en-US" dirty="0" smtClean="0"/>
+              <a:rPr lang="en-US" dirty="0"/>
               <a:t>Allan Cooper</a:t>
             </a:r>
           </a:p>
           <a:p>
             <a:pPr lvl="1"/>
             <a:r>
-              <a:rPr lang="en-US" dirty="0" smtClean="0"/>
+              <a:rPr lang="en-US" dirty="0"/>
               <a:t>30 minutes</a:t>
             </a:r>
           </a:p>
           <a:p>
             <a:r>
-              <a:rPr lang="en-US" i="1" dirty="0" smtClean="0"/>
-              <a:t>Monoids </a:t>
-            </a:r>
-            <a:r>
               <a:rPr lang="en-US" i="1" dirty="0"/>
-              <a:t>in the Category of Strong </a:t>
+              <a:t>Monoids in the Category of Strong </a:t>
             </a:r>
             <a:r>
               <a:rPr lang="en-US" i="1" dirty="0" err="1"/>
@@ -3489,62 +3390,54 @@
             </a:r>
             <a:r>
               <a:rPr lang="en-US" i="1" dirty="0"/>
-              <a:t> a.k.a. </a:t>
-            </a:r>
-            <a:r>
-              <a:rPr lang="en-US" i="1" dirty="0" smtClean="0"/>
-              <a:t>Arrows</a:t>
+              <a:t> a.k.a. Arrows</a:t>
             </a:r>
           </a:p>
           <a:p>
             <a:pPr lvl="1"/>
             <a:r>
-              <a:rPr lang="en-US" dirty="0" err="1" smtClean="0"/>
+              <a:rPr lang="en-US" dirty="0" err="1"/>
               <a:t>Bartosz</a:t>
             </a:r>
             <a:r>
-              <a:rPr lang="en-US" dirty="0" smtClean="0"/>
+              <a:rPr lang="en-US" dirty="0"/>
               <a:t> </a:t>
             </a:r>
             <a:r>
-              <a:rPr lang="en-US" dirty="0" err="1" smtClean="0"/>
+              <a:rPr lang="en-US" dirty="0" err="1"/>
               <a:t>Milewski</a:t>
             </a:r>
-            <a:endParaRPr lang="en-US" dirty="0" smtClean="0"/>
+            <a:endParaRPr lang="en-US" dirty="0"/>
           </a:p>
           <a:p>
             <a:pPr lvl="1"/>
             <a:r>
-              <a:rPr lang="en-US" dirty="0" smtClean="0"/>
+              <a:rPr lang="en-US" dirty="0"/>
               <a:t>30 minutes</a:t>
             </a:r>
           </a:p>
           <a:p>
             <a:r>
-              <a:rPr lang="en-US" i="1" dirty="0" smtClean="0"/>
-              <a:t>Applicative </a:t>
-            </a:r>
-            <a:r>
               <a:rPr lang="en-US" i="1" dirty="0"/>
-              <a:t>parser </a:t>
-            </a:r>
-            <a:r>
-              <a:rPr lang="en-US" i="1" dirty="0" err="1" smtClean="0"/>
+              <a:t>Applicative parser </a:t>
+            </a:r>
+            <a:r>
+              <a:rPr lang="en-US" i="1" dirty="0" err="1"/>
               <a:t>combinators</a:t>
             </a:r>
-            <a:endParaRPr lang="en-US" i="1" dirty="0" smtClean="0"/>
+            <a:endParaRPr lang="en-US" i="1" dirty="0"/>
           </a:p>
           <a:p>
             <a:pPr lvl="1"/>
             <a:r>
-              <a:rPr lang="en-US" dirty="0" smtClean="0"/>
+              <a:rPr lang="en-US" dirty="0"/>
               <a:t>John Leo</a:t>
             </a:r>
           </a:p>
           <a:p>
             <a:pPr lvl="1"/>
             <a:r>
-              <a:rPr lang="en-US" dirty="0" smtClean="0"/>
+              <a:rPr lang="en-US" dirty="0"/>
               <a:t>30–60 minutes</a:t>
             </a:r>
           </a:p>
@@ -3560,13 +3453,6 @@
   <p:clrMapOvr>
     <a:masterClrMapping/>
   </p:clrMapOvr>
-  <p:timing>
-    <p:tnLst>
-      <p:par>
-        <p:cTn id="1" dur="indefinite" restart="never" nodeType="tmRoot"/>
-      </p:par>
-    </p:tnLst>
-  </p:timing>
 </p:sld>
 </file>
 

</xml_diff>